<commit_message>
Added board layout tips to workshop 106
</commit_message>
<xml_diff>
--- a/100 - Analog Electronics Fundamentals/106/Analog Electronics Fundamentals 106.pptx
+++ b/100 - Analog Electronics Fundamentals/106/Analog Electronics Fundamentals 106.pptx
@@ -290,7 +290,7 @@
             <a:fld id="{29A1C4C6-CF9E-4C57-810C-C8B73CF99206}" type="datetimeFigureOut">
               <a:rPr lang="en-CA" smtClean="0"/>
               <a:pPr/>
-              <a:t>21/08/2012</a:t>
+              <a:t>22/08/2012</a:t>
             </a:fld>
             <a:endParaRPr lang="en-CA"/>
           </a:p>
@@ -457,7 +457,7 @@
             <a:fld id="{29A1C4C6-CF9E-4C57-810C-C8B73CF99206}" type="datetimeFigureOut">
               <a:rPr lang="en-CA" smtClean="0"/>
               <a:pPr/>
-              <a:t>21/08/2012</a:t>
+              <a:t>22/08/2012</a:t>
             </a:fld>
             <a:endParaRPr lang="en-CA"/>
           </a:p>
@@ -634,7 +634,7 @@
             <a:fld id="{29A1C4C6-CF9E-4C57-810C-C8B73CF99206}" type="datetimeFigureOut">
               <a:rPr lang="en-CA" smtClean="0"/>
               <a:pPr/>
-              <a:t>21/08/2012</a:t>
+              <a:t>22/08/2012</a:t>
             </a:fld>
             <a:endParaRPr lang="en-CA"/>
           </a:p>
@@ -801,7 +801,7 @@
             <a:fld id="{29A1C4C6-CF9E-4C57-810C-C8B73CF99206}" type="datetimeFigureOut">
               <a:rPr lang="en-CA" smtClean="0"/>
               <a:pPr/>
-              <a:t>21/08/2012</a:t>
+              <a:t>22/08/2012</a:t>
             </a:fld>
             <a:endParaRPr lang="en-CA"/>
           </a:p>
@@ -1044,7 +1044,7 @@
             <a:fld id="{29A1C4C6-CF9E-4C57-810C-C8B73CF99206}" type="datetimeFigureOut">
               <a:rPr lang="en-CA" smtClean="0"/>
               <a:pPr/>
-              <a:t>21/08/2012</a:t>
+              <a:t>22/08/2012</a:t>
             </a:fld>
             <a:endParaRPr lang="en-CA"/>
           </a:p>
@@ -1329,7 +1329,7 @@
             <a:fld id="{29A1C4C6-CF9E-4C57-810C-C8B73CF99206}" type="datetimeFigureOut">
               <a:rPr lang="en-CA" smtClean="0"/>
               <a:pPr/>
-              <a:t>21/08/2012</a:t>
+              <a:t>22/08/2012</a:t>
             </a:fld>
             <a:endParaRPr lang="en-CA"/>
           </a:p>
@@ -1748,7 +1748,7 @@
             <a:fld id="{29A1C4C6-CF9E-4C57-810C-C8B73CF99206}" type="datetimeFigureOut">
               <a:rPr lang="en-CA" smtClean="0"/>
               <a:pPr/>
-              <a:t>21/08/2012</a:t>
+              <a:t>22/08/2012</a:t>
             </a:fld>
             <a:endParaRPr lang="en-CA"/>
           </a:p>
@@ -1863,7 +1863,7 @@
             <a:fld id="{29A1C4C6-CF9E-4C57-810C-C8B73CF99206}" type="datetimeFigureOut">
               <a:rPr lang="en-CA" smtClean="0"/>
               <a:pPr/>
-              <a:t>21/08/2012</a:t>
+              <a:t>22/08/2012</a:t>
             </a:fld>
             <a:endParaRPr lang="en-CA"/>
           </a:p>
@@ -1955,7 +1955,7 @@
             <a:fld id="{29A1C4C6-CF9E-4C57-810C-C8B73CF99206}" type="datetimeFigureOut">
               <a:rPr lang="en-CA" smtClean="0"/>
               <a:pPr/>
-              <a:t>21/08/2012</a:t>
+              <a:t>22/08/2012</a:t>
             </a:fld>
             <a:endParaRPr lang="en-CA"/>
           </a:p>
@@ -2229,7 +2229,7 @@
             <a:fld id="{29A1C4C6-CF9E-4C57-810C-C8B73CF99206}" type="datetimeFigureOut">
               <a:rPr lang="en-CA" smtClean="0"/>
               <a:pPr/>
-              <a:t>21/08/2012</a:t>
+              <a:t>22/08/2012</a:t>
             </a:fld>
             <a:endParaRPr lang="en-CA"/>
           </a:p>
@@ -2479,7 +2479,7 @@
             <a:fld id="{29A1C4C6-CF9E-4C57-810C-C8B73CF99206}" type="datetimeFigureOut">
               <a:rPr lang="en-CA" smtClean="0"/>
               <a:pPr/>
-              <a:t>21/08/2012</a:t>
+              <a:t>22/08/2012</a:t>
             </a:fld>
             <a:endParaRPr lang="en-CA"/>
           </a:p>
@@ -2689,7 +2689,7 @@
             <a:fld id="{29A1C4C6-CF9E-4C57-810C-C8B73CF99206}" type="datetimeFigureOut">
               <a:rPr lang="en-CA" smtClean="0"/>
               <a:pPr/>
-              <a:t>21/08/2012</a:t>
+              <a:t>22/08/2012</a:t>
             </a:fld>
             <a:endParaRPr lang="en-CA"/>
           </a:p>
@@ -3089,18 +3089,7 @@
                   </a:schemeClr>
                 </a:solidFill>
               </a:rPr>
-              <a:t>Analog Electronics Fundamentals </a:t>
-            </a:r>
-            <a:r>
-              <a:rPr lang="en-CA" dirty="0" smtClean="0">
-                <a:solidFill>
-                  <a:schemeClr val="tx1">
-                    <a:lumMod val="95000"/>
-                    <a:lumOff val="5000"/>
-                  </a:schemeClr>
-                </a:solidFill>
-              </a:rPr>
-              <a:t>105</a:t>
+              <a:t>Analog Electronics Fundamentals 105</a:t>
             </a:r>
             <a:endParaRPr lang="en-CA" dirty="0">
               <a:solidFill>
@@ -3147,14 +3136,6 @@
               </a:rPr>
               <a:t>-DIY PCB Etching</a:t>
             </a:r>
-            <a:endParaRPr lang="en-CA" dirty="0" smtClean="0">
-              <a:solidFill>
-                <a:schemeClr val="tx1">
-                  <a:lumMod val="75000"/>
-                  <a:lumOff val="25000"/>
-                </a:schemeClr>
-              </a:solidFill>
-            </a:endParaRPr>
           </a:p>
         </p:txBody>
       </p:sp>
@@ -3300,11 +3281,7 @@
             <a:pPr algn="just"/>
             <a:r>
               <a:rPr lang="en-CA" sz="1400" dirty="0" smtClean="0"/>
-              <a:t>Before we get started, do yourself a favour and </a:t>
-            </a:r>
-            <a:r>
-              <a:rPr lang="en-CA" sz="1400" dirty="0" smtClean="0"/>
-              <a:t>read these safety tips:</a:t>
+              <a:t>Before we get started, do yourself a favour and read these safety tips:</a:t>
             </a:r>
           </a:p>
           <a:p>
@@ -3325,22 +3302,37 @@
             <a:pPr lvl="1" algn="just"/>
             <a:r>
               <a:rPr lang="en-CA" sz="1000" dirty="0" smtClean="0"/>
-              <a:t>Use Caution</a:t>
+              <a:t>Use </a:t>
+            </a:r>
+            <a:r>
+              <a:rPr lang="en-CA" sz="1000" dirty="0" smtClean="0"/>
+              <a:t>Caution</a:t>
+            </a:r>
+          </a:p>
+          <a:p>
+            <a:pPr algn="just"/>
+            <a:r>
+              <a:rPr lang="en-CA" sz="1400" dirty="0" smtClean="0"/>
+              <a:t>Board Layout Tips</a:t>
             </a:r>
           </a:p>
           <a:p>
             <a:pPr lvl="1" algn="just"/>
             <a:r>
               <a:rPr lang="en-CA" sz="1000" dirty="0" smtClean="0"/>
-              <a:t>Don’t be an idiot!</a:t>
+              <a:t>Wherever possible, follow a 50mil-50mil rule. Traces 50mils in width, and 50mils spacing between traces</a:t>
             </a:r>
           </a:p>
           <a:p>
             <a:pPr lvl="1" algn="just"/>
-            <a:endParaRPr lang="en-CA" sz="1000" dirty="0" smtClean="0"/>
-          </a:p>
-          <a:p>
-            <a:pPr lvl="1" algn="just"/>
+            <a:r>
+              <a:rPr lang="en-CA" sz="1000" dirty="0" smtClean="0"/>
+              <a:t>Fatten up those pads. 50mils drill holes, and 75mils diameter</a:t>
+            </a:r>
+            <a:r>
+              <a:rPr lang="en-CA" sz="1000" dirty="0" smtClean="0"/>
+              <a:t>.</a:t>
+            </a:r>
             <a:endParaRPr lang="en-CA" sz="1000" dirty="0" smtClean="0"/>
           </a:p>
           <a:p>
@@ -3368,11 +3360,12 @@
             <a:pPr lvl="1" algn="just"/>
             <a:r>
               <a:rPr lang="en-CA" sz="1000" dirty="0" smtClean="0"/>
-              <a:t>1 pinch of Kosher salt (this will speed up the etching process).</a:t>
-            </a:r>
-          </a:p>
-          <a:p>
-            <a:pPr lvl="1" algn="just"/>
+              <a:t>1 pinch of Kosher salt (this will speed up the etching process</a:t>
+            </a:r>
+            <a:r>
+              <a:rPr lang="en-CA" sz="1000" dirty="0" smtClean="0"/>
+              <a:t>).</a:t>
+            </a:r>
             <a:endParaRPr lang="en-CA" sz="1000" dirty="0" smtClean="0"/>
           </a:p>
           <a:p>
@@ -3459,11 +3452,16 @@
             </a:pPr>
             <a:r>
               <a:rPr lang="en-CA" sz="1000" dirty="0" smtClean="0"/>
-              <a:t>Wait a few minutes for the paper to start dissolving, and gently peel the paper away.</a:t>
-            </a:r>
-          </a:p>
-          <a:p>
-            <a:pPr algn="just"/>
+              <a:t>Wait a few minutes for the paper to start dissolving, and gently peel the paper </a:t>
+            </a:r>
+            <a:r>
+              <a:rPr lang="en-CA" sz="1000" smtClean="0"/>
+              <a:t>away</a:t>
+            </a:r>
+            <a:r>
+              <a:rPr lang="en-CA" sz="1000" smtClean="0"/>
+              <a:t>.</a:t>
+            </a:r>
             <a:endParaRPr lang="en-CA" sz="1400" dirty="0" smtClean="0"/>
           </a:p>
           <a:p>
@@ -3484,13 +3482,8 @@
             <a:pPr lvl="1" algn="just"/>
             <a:r>
               <a:rPr lang="en-CA" sz="1000" dirty="0" smtClean="0"/>
-              <a:t>In the final minutes of the etching process, swirl the container a little, that will help etching in </a:t>
-            </a:r>
-            <a:r>
-              <a:rPr lang="en-CA" sz="1000" smtClean="0"/>
-              <a:t>tight spots.</a:t>
-            </a:r>
-            <a:endParaRPr lang="en-CA" sz="1000" dirty="0" smtClean="0"/>
+              <a:t>In the final minutes of the etching process, swirl the container a little, that will help etching in tight spots.</a:t>
+            </a:r>
           </a:p>
           <a:p>
             <a:pPr lvl="1" algn="just">

</xml_diff>